<commit_message>
Kniznica Jenetics vymazana a algoritmus som napisal sam. Vyvoj fitness podla velkosti skupiny.
</commit_message>
<xml_diff>
--- a/prezentacia.pptx
+++ b/prezentacia.pptx
@@ -121,6 +121,9 @@
           </p14:sldIdLst>
         </p14:section>
       </p14:sectionLst>
+    </p:ext>
+    <p:ext uri="{EFAFB233-063F-42B5-8137-9DF3F51BA10A}">
+      <p15:sldGuideLst xmlns:p15="http://schemas.microsoft.com/office/powerpoint/2012/main"/>
     </p:ext>
   </p:extLst>
 </p:presentation>
@@ -628,7 +631,7 @@
           <a:p>
             <a:fld id="{088A4D84-9354-4F22-829F-55ED811A3CD2}" type="datetimeFigureOut">
               <a:rPr lang="sk-SK" smtClean="0"/>
-              <a:t>25. 2. 2015</a:t>
+              <a:t>4. 3. 2015</a:t>
             </a:fld>
             <a:endParaRPr lang="sk-SK"/>
           </a:p>
@@ -924,7 +927,7 @@
           <a:p>
             <a:fld id="{088A4D84-9354-4F22-829F-55ED811A3CD2}" type="datetimeFigureOut">
               <a:rPr lang="sk-SK" smtClean="0"/>
-              <a:t>25. 2. 2015</a:t>
+              <a:t>4. 3. 2015</a:t>
             </a:fld>
             <a:endParaRPr lang="sk-SK"/>
           </a:p>
@@ -1172,7 +1175,7 @@
           <a:p>
             <a:fld id="{088A4D84-9354-4F22-829F-55ED811A3CD2}" type="datetimeFigureOut">
               <a:rPr lang="sk-SK" smtClean="0"/>
-              <a:t>25. 2. 2015</a:t>
+              <a:t>4. 3. 2015</a:t>
             </a:fld>
             <a:endParaRPr lang="sk-SK"/>
           </a:p>
@@ -1712,7 +1715,7 @@
           <a:p>
             <a:fld id="{088A4D84-9354-4F22-829F-55ED811A3CD2}" type="datetimeFigureOut">
               <a:rPr lang="sk-SK" smtClean="0"/>
-              <a:t>25. 2. 2015</a:t>
+              <a:t>4. 3. 2015</a:t>
             </a:fld>
             <a:endParaRPr lang="sk-SK"/>
           </a:p>
@@ -1960,7 +1963,7 @@
           <a:p>
             <a:fld id="{088A4D84-9354-4F22-829F-55ED811A3CD2}" type="datetimeFigureOut">
               <a:rPr lang="sk-SK" smtClean="0"/>
-              <a:t>25. 2. 2015</a:t>
+              <a:t>4. 3. 2015</a:t>
             </a:fld>
             <a:endParaRPr lang="sk-SK"/>
           </a:p>
@@ -2492,7 +2495,7 @@
           <a:p>
             <a:fld id="{088A4D84-9354-4F22-829F-55ED811A3CD2}" type="datetimeFigureOut">
               <a:rPr lang="sk-SK" smtClean="0"/>
-              <a:t>25. 2. 2015</a:t>
+              <a:t>4. 3. 2015</a:t>
             </a:fld>
             <a:endParaRPr lang="sk-SK"/>
           </a:p>
@@ -2789,7 +2792,7 @@
           <a:p>
             <a:fld id="{088A4D84-9354-4F22-829F-55ED811A3CD2}" type="datetimeFigureOut">
               <a:rPr lang="sk-SK" smtClean="0"/>
-              <a:t>25. 2. 2015</a:t>
+              <a:t>4. 3. 2015</a:t>
             </a:fld>
             <a:endParaRPr lang="sk-SK"/>
           </a:p>
@@ -2963,7 +2966,7 @@
           <a:p>
             <a:fld id="{088A4D84-9354-4F22-829F-55ED811A3CD2}" type="datetimeFigureOut">
               <a:rPr lang="sk-SK" smtClean="0"/>
-              <a:t>25. 2. 2015</a:t>
+              <a:t>4. 3. 2015</a:t>
             </a:fld>
             <a:endParaRPr lang="sk-SK"/>
           </a:p>
@@ -3143,7 +3146,7 @@
           <a:p>
             <a:fld id="{088A4D84-9354-4F22-829F-55ED811A3CD2}" type="datetimeFigureOut">
               <a:rPr lang="sk-SK" smtClean="0"/>
-              <a:t>25. 2. 2015</a:t>
+              <a:t>4. 3. 2015</a:t>
             </a:fld>
             <a:endParaRPr lang="sk-SK"/>
           </a:p>
@@ -3313,7 +3316,7 @@
           <a:p>
             <a:fld id="{088A4D84-9354-4F22-829F-55ED811A3CD2}" type="datetimeFigureOut">
               <a:rPr lang="sk-SK" smtClean="0"/>
-              <a:t>25. 2. 2015</a:t>
+              <a:t>4. 3. 2015</a:t>
             </a:fld>
             <a:endParaRPr lang="sk-SK"/>
           </a:p>
@@ -3564,7 +3567,7 @@
           <a:p>
             <a:fld id="{088A4D84-9354-4F22-829F-55ED811A3CD2}" type="datetimeFigureOut">
               <a:rPr lang="sk-SK" smtClean="0"/>
-              <a:t>25. 2. 2015</a:t>
+              <a:t>4. 3. 2015</a:t>
             </a:fld>
             <a:endParaRPr lang="sk-SK"/>
           </a:p>
@@ -3861,7 +3864,7 @@
           <a:p>
             <a:fld id="{088A4D84-9354-4F22-829F-55ED811A3CD2}" type="datetimeFigureOut">
               <a:rPr lang="sk-SK" smtClean="0"/>
-              <a:t>25. 2. 2015</a:t>
+              <a:t>4. 3. 2015</a:t>
             </a:fld>
             <a:endParaRPr lang="sk-SK"/>
           </a:p>
@@ -4303,7 +4306,7 @@
           <a:p>
             <a:fld id="{088A4D84-9354-4F22-829F-55ED811A3CD2}" type="datetimeFigureOut">
               <a:rPr lang="sk-SK" smtClean="0"/>
-              <a:t>25. 2. 2015</a:t>
+              <a:t>4. 3. 2015</a:t>
             </a:fld>
             <a:endParaRPr lang="sk-SK"/>
           </a:p>
@@ -4421,7 +4424,7 @@
           <a:p>
             <a:fld id="{088A4D84-9354-4F22-829F-55ED811A3CD2}" type="datetimeFigureOut">
               <a:rPr lang="sk-SK" smtClean="0"/>
-              <a:t>25. 2. 2015</a:t>
+              <a:t>4. 3. 2015</a:t>
             </a:fld>
             <a:endParaRPr lang="sk-SK"/>
           </a:p>
@@ -4516,7 +4519,7 @@
           <a:p>
             <a:fld id="{088A4D84-9354-4F22-829F-55ED811A3CD2}" type="datetimeFigureOut">
               <a:rPr lang="sk-SK" smtClean="0"/>
-              <a:t>25. 2. 2015</a:t>
+              <a:t>4. 3. 2015</a:t>
             </a:fld>
             <a:endParaRPr lang="sk-SK"/>
           </a:p>
@@ -4799,7 +4802,7 @@
           <a:p>
             <a:fld id="{088A4D84-9354-4F22-829F-55ED811A3CD2}" type="datetimeFigureOut">
               <a:rPr lang="sk-SK" smtClean="0"/>
-              <a:t>25. 2. 2015</a:t>
+              <a:t>4. 3. 2015</a:t>
             </a:fld>
             <a:endParaRPr lang="sk-SK"/>
           </a:p>
@@ -5090,7 +5093,7 @@
           <a:p>
             <a:fld id="{088A4D84-9354-4F22-829F-55ED811A3CD2}" type="datetimeFigureOut">
               <a:rPr lang="sk-SK" smtClean="0"/>
-              <a:t>25. 2. 2015</a:t>
+              <a:t>4. 3. 2015</a:t>
             </a:fld>
             <a:endParaRPr lang="sk-SK"/>
           </a:p>
@@ -5620,7 +5623,7 @@
           <a:p>
             <a:fld id="{088A4D84-9354-4F22-829F-55ED811A3CD2}" type="datetimeFigureOut">
               <a:rPr lang="sk-SK" smtClean="0"/>
-              <a:t>25. 2. 2015</a:t>
+              <a:t>4. 3. 2015</a:t>
             </a:fld>
             <a:endParaRPr lang="sk-SK"/>
           </a:p>
@@ -7013,9 +7016,79 @@
         </p:nvSpPr>
         <p:spPr/>
         <p:txBody>
-          <a:bodyPr/>
+          <a:bodyPr>
+            <a:normAutofit fontScale="62500" lnSpcReduction="20000"/>
+          </a:bodyPr>
           <a:lstStyle/>
           <a:p>
+            <a:r>
+              <a:rPr lang="en-US" dirty="0"/>
+              <a:t>This class is for mutating a chromosomes of an given population. There are two distinct roles mutation </a:t>
+            </a:r>
+            <a:r>
+              <a:rPr lang="en-US" dirty="0" err="1"/>
+              <a:t>playsExploring</a:t>
+            </a:r>
+            <a:r>
+              <a:rPr lang="en-US" dirty="0"/>
+              <a:t> the search space. By making small moves mutation allows a population to explore the search space. This exploration is often slow compared to crossover, but in problems where crossover is disruptive this can be an important way to explore the landscape.</a:t>
+            </a:r>
+          </a:p>
+          <a:p>
+            <a:r>
+              <a:rPr lang="en-US" dirty="0"/>
+              <a:t>Maintaining diversity. Mutation prevents a population from correlating. Even if most of the search is being performed by crossover, mutation can be vital to provide the diversity which crossover needs.</a:t>
+            </a:r>
+          </a:p>
+          <a:p>
+            <a:r>
+              <a:rPr lang="en-US" dirty="0"/>
+              <a:t>The mutation probability is the parameter that must be optimized. The optimal value of the mutation rate depends on the role mutation plays. If mutation is the only source of exploration (if there is no crossover) then the mutation rate should be set so that a reasonable neighborhood of solutions is explored.</a:t>
+            </a:r>
+          </a:p>
+          <a:p>
+            <a:r>
+              <a:rPr lang="en-US" dirty="0"/>
+              <a:t>The mutation probability </a:t>
+            </a:r>
+            <a:r>
+              <a:rPr lang="en-US" i="1" dirty="0"/>
+              <a:t>P(m)</a:t>
+            </a:r>
+            <a:r>
+              <a:rPr lang="en-US" dirty="0"/>
+              <a:t> is the probability that a specific gene over the whole population is mutated. The number of available genes of an population is</a:t>
+            </a:r>
+          </a:p>
+          <a:p>
+            <a:r>
+              <a:rPr lang="en-US" dirty="0"/>
+              <a:t>where </a:t>
+            </a:r>
+            <a:r>
+              <a:rPr lang="en-US" i="1" dirty="0"/>
+              <a:t>N</a:t>
+            </a:r>
+            <a:r>
+              <a:rPr lang="en-US" i="1" baseline="-25000" dirty="0"/>
+              <a:t>P</a:t>
+            </a:r>
+            <a:r>
+              <a:rPr lang="en-US" dirty="0"/>
+              <a:t> is the population size, </a:t>
+            </a:r>
+            <a:r>
+              <a:rPr lang="en-US" i="1" dirty="0"/>
+              <a:t>N</a:t>
+            </a:r>
+            <a:r>
+              <a:rPr lang="en-US" i="1" baseline="-25000" dirty="0"/>
+              <a:t>g</a:t>
+            </a:r>
+            <a:r>
+              <a:rPr lang="en-US" dirty="0"/>
+              <a:t> the number of genes of a genotype. So the (average) number of genes mutated by the mutation is</a:t>
+            </a:r>
             <a:endParaRPr lang="sk-SK" dirty="0"/>
           </a:p>
         </p:txBody>

</xml_diff>

<commit_message>
Zachyteny vyvoj fitness v cez grafy.
</commit_message>
<xml_diff>
--- a/prezentacia.pptx
+++ b/prezentacia.pptx
@@ -7,9 +7,10 @@
   <p:sldIdLst>
     <p:sldId id="256" r:id="rId2"/>
     <p:sldId id="258" r:id="rId3"/>
-    <p:sldId id="260" r:id="rId4"/>
-    <p:sldId id="257" r:id="rId5"/>
-    <p:sldId id="259" r:id="rId6"/>
+    <p:sldId id="261" r:id="rId4"/>
+    <p:sldId id="260" r:id="rId5"/>
+    <p:sldId id="257" r:id="rId6"/>
+    <p:sldId id="259" r:id="rId7"/>
   </p:sldIdLst>
   <p:sldSz cx="12192000" cy="6858000"/>
   <p:notesSz cx="6858000" cy="9144000"/>
@@ -115,6 +116,7 @@
           <p14:sldIdLst>
             <p14:sldId id="256"/>
             <p14:sldId id="258"/>
+            <p14:sldId id="261"/>
             <p14:sldId id="260"/>
             <p14:sldId id="257"/>
             <p14:sldId id="259"/>
@@ -631,7 +633,7 @@
           <a:p>
             <a:fld id="{088A4D84-9354-4F22-829F-55ED811A3CD2}" type="datetimeFigureOut">
               <a:rPr lang="sk-SK" smtClean="0"/>
-              <a:t>4. 3. 2015</a:t>
+              <a:t>5. 3. 2015</a:t>
             </a:fld>
             <a:endParaRPr lang="sk-SK"/>
           </a:p>
@@ -927,7 +929,7 @@
           <a:p>
             <a:fld id="{088A4D84-9354-4F22-829F-55ED811A3CD2}" type="datetimeFigureOut">
               <a:rPr lang="sk-SK" smtClean="0"/>
-              <a:t>4. 3. 2015</a:t>
+              <a:t>5. 3. 2015</a:t>
             </a:fld>
             <a:endParaRPr lang="sk-SK"/>
           </a:p>
@@ -1175,7 +1177,7 @@
           <a:p>
             <a:fld id="{088A4D84-9354-4F22-829F-55ED811A3CD2}" type="datetimeFigureOut">
               <a:rPr lang="sk-SK" smtClean="0"/>
-              <a:t>4. 3. 2015</a:t>
+              <a:t>5. 3. 2015</a:t>
             </a:fld>
             <a:endParaRPr lang="sk-SK"/>
           </a:p>
@@ -1715,7 +1717,7 @@
           <a:p>
             <a:fld id="{088A4D84-9354-4F22-829F-55ED811A3CD2}" type="datetimeFigureOut">
               <a:rPr lang="sk-SK" smtClean="0"/>
-              <a:t>4. 3. 2015</a:t>
+              <a:t>5. 3. 2015</a:t>
             </a:fld>
             <a:endParaRPr lang="sk-SK"/>
           </a:p>
@@ -1963,7 +1965,7 @@
           <a:p>
             <a:fld id="{088A4D84-9354-4F22-829F-55ED811A3CD2}" type="datetimeFigureOut">
               <a:rPr lang="sk-SK" smtClean="0"/>
-              <a:t>4. 3. 2015</a:t>
+              <a:t>5. 3. 2015</a:t>
             </a:fld>
             <a:endParaRPr lang="sk-SK"/>
           </a:p>
@@ -2495,7 +2497,7 @@
           <a:p>
             <a:fld id="{088A4D84-9354-4F22-829F-55ED811A3CD2}" type="datetimeFigureOut">
               <a:rPr lang="sk-SK" smtClean="0"/>
-              <a:t>4. 3. 2015</a:t>
+              <a:t>5. 3. 2015</a:t>
             </a:fld>
             <a:endParaRPr lang="sk-SK"/>
           </a:p>
@@ -2792,7 +2794,7 @@
           <a:p>
             <a:fld id="{088A4D84-9354-4F22-829F-55ED811A3CD2}" type="datetimeFigureOut">
               <a:rPr lang="sk-SK" smtClean="0"/>
-              <a:t>4. 3. 2015</a:t>
+              <a:t>5. 3. 2015</a:t>
             </a:fld>
             <a:endParaRPr lang="sk-SK"/>
           </a:p>
@@ -2966,7 +2968,7 @@
           <a:p>
             <a:fld id="{088A4D84-9354-4F22-829F-55ED811A3CD2}" type="datetimeFigureOut">
               <a:rPr lang="sk-SK" smtClean="0"/>
-              <a:t>4. 3. 2015</a:t>
+              <a:t>5. 3. 2015</a:t>
             </a:fld>
             <a:endParaRPr lang="sk-SK"/>
           </a:p>
@@ -3146,7 +3148,7 @@
           <a:p>
             <a:fld id="{088A4D84-9354-4F22-829F-55ED811A3CD2}" type="datetimeFigureOut">
               <a:rPr lang="sk-SK" smtClean="0"/>
-              <a:t>4. 3. 2015</a:t>
+              <a:t>5. 3. 2015</a:t>
             </a:fld>
             <a:endParaRPr lang="sk-SK"/>
           </a:p>
@@ -3316,7 +3318,7 @@
           <a:p>
             <a:fld id="{088A4D84-9354-4F22-829F-55ED811A3CD2}" type="datetimeFigureOut">
               <a:rPr lang="sk-SK" smtClean="0"/>
-              <a:t>4. 3. 2015</a:t>
+              <a:t>5. 3. 2015</a:t>
             </a:fld>
             <a:endParaRPr lang="sk-SK"/>
           </a:p>
@@ -3567,7 +3569,7 @@
           <a:p>
             <a:fld id="{088A4D84-9354-4F22-829F-55ED811A3CD2}" type="datetimeFigureOut">
               <a:rPr lang="sk-SK" smtClean="0"/>
-              <a:t>4. 3. 2015</a:t>
+              <a:t>5. 3. 2015</a:t>
             </a:fld>
             <a:endParaRPr lang="sk-SK"/>
           </a:p>
@@ -3864,7 +3866,7 @@
           <a:p>
             <a:fld id="{088A4D84-9354-4F22-829F-55ED811A3CD2}" type="datetimeFigureOut">
               <a:rPr lang="sk-SK" smtClean="0"/>
-              <a:t>4. 3. 2015</a:t>
+              <a:t>5. 3. 2015</a:t>
             </a:fld>
             <a:endParaRPr lang="sk-SK"/>
           </a:p>
@@ -4306,7 +4308,7 @@
           <a:p>
             <a:fld id="{088A4D84-9354-4F22-829F-55ED811A3CD2}" type="datetimeFigureOut">
               <a:rPr lang="sk-SK" smtClean="0"/>
-              <a:t>4. 3. 2015</a:t>
+              <a:t>5. 3. 2015</a:t>
             </a:fld>
             <a:endParaRPr lang="sk-SK"/>
           </a:p>
@@ -4424,7 +4426,7 @@
           <a:p>
             <a:fld id="{088A4D84-9354-4F22-829F-55ED811A3CD2}" type="datetimeFigureOut">
               <a:rPr lang="sk-SK" smtClean="0"/>
-              <a:t>4. 3. 2015</a:t>
+              <a:t>5. 3. 2015</a:t>
             </a:fld>
             <a:endParaRPr lang="sk-SK"/>
           </a:p>
@@ -4519,7 +4521,7 @@
           <a:p>
             <a:fld id="{088A4D84-9354-4F22-829F-55ED811A3CD2}" type="datetimeFigureOut">
               <a:rPr lang="sk-SK" smtClean="0"/>
-              <a:t>4. 3. 2015</a:t>
+              <a:t>5. 3. 2015</a:t>
             </a:fld>
             <a:endParaRPr lang="sk-SK"/>
           </a:p>
@@ -4802,7 +4804,7 @@
           <a:p>
             <a:fld id="{088A4D84-9354-4F22-829F-55ED811A3CD2}" type="datetimeFigureOut">
               <a:rPr lang="sk-SK" smtClean="0"/>
-              <a:t>4. 3. 2015</a:t>
+              <a:t>5. 3. 2015</a:t>
             </a:fld>
             <a:endParaRPr lang="sk-SK"/>
           </a:p>
@@ -5093,7 +5095,7 @@
           <a:p>
             <a:fld id="{088A4D84-9354-4F22-829F-55ED811A3CD2}" type="datetimeFigureOut">
               <a:rPr lang="sk-SK" smtClean="0"/>
-              <a:t>4. 3. 2015</a:t>
+              <a:t>5. 3. 2015</a:t>
             </a:fld>
             <a:endParaRPr lang="sk-SK"/>
           </a:p>
@@ -5623,7 +5625,7 @@
           <a:p>
             <a:fld id="{088A4D84-9354-4F22-829F-55ED811A3CD2}" type="datetimeFigureOut">
               <a:rPr lang="sk-SK" smtClean="0"/>
-              <a:t>4. 3. 2015</a:t>
+              <a:t>5. 3. 2015</a:t>
             </a:fld>
             <a:endParaRPr lang="sk-SK"/>
           </a:p>
@@ -6170,30 +6172,14 @@
           <a:lstStyle/>
           <a:p>
             <a:r>
-              <a:rPr lang="en-US" dirty="0" smtClean="0"/>
+              <a:rPr lang="sk-SK" noProof="0" dirty="0" smtClean="0"/>
               <a:t>[EA] </a:t>
             </a:r>
             <a:r>
-              <a:rPr lang="en-US" dirty="0" err="1" smtClean="0"/>
-              <a:t>Pohyb</a:t>
-            </a:r>
-            <a:r>
-              <a:rPr lang="en-US" dirty="0" smtClean="0"/>
-              <a:t> </a:t>
-            </a:r>
-            <a:r>
-              <a:rPr lang="en-US" dirty="0" err="1" smtClean="0"/>
-              <a:t>po</a:t>
-            </a:r>
-            <a:r>
-              <a:rPr lang="en-US" dirty="0" smtClean="0"/>
-              <a:t> </a:t>
-            </a:r>
-            <a:r>
-              <a:rPr lang="en-US" dirty="0" err="1" smtClean="0"/>
-              <a:t>mape</a:t>
-            </a:r>
-            <a:endParaRPr lang="sk-SK" dirty="0"/>
+              <a:rPr lang="sk-SK" noProof="0" dirty="0" smtClean="0"/>
+              <a:t>Vývojár reťazcov</a:t>
+            </a:r>
+            <a:endParaRPr lang="sk-SK" noProof="0" dirty="0"/>
           </a:p>
         </p:txBody>
       </p:sp>
@@ -6213,14 +6199,18 @@
           <a:lstStyle/>
           <a:p>
             <a:r>
-              <a:rPr lang="en-US" dirty="0" smtClean="0"/>
-              <a:t>Lukas </a:t>
-            </a:r>
-            <a:r>
-              <a:rPr lang="en-US" dirty="0" err="1" smtClean="0"/>
+              <a:rPr lang="sk-SK" noProof="0" dirty="0" err="1" smtClean="0"/>
+              <a:t>Lukas</a:t>
+            </a:r>
+            <a:r>
+              <a:rPr lang="sk-SK" noProof="0" dirty="0" smtClean="0"/>
+              <a:t> </a:t>
+            </a:r>
+            <a:r>
+              <a:rPr lang="sk-SK" noProof="0" dirty="0" err="1" smtClean="0"/>
               <a:t>Sekerak</a:t>
             </a:r>
-            <a:endParaRPr lang="sk-SK" dirty="0"/>
+            <a:endParaRPr lang="sk-SK" noProof="0" dirty="0"/>
           </a:p>
         </p:txBody>
       </p:sp>
@@ -6278,131 +6268,121 @@
           <a:p>
             <a:pPr algn="l"/>
             <a:r>
-              <a:rPr lang="en-US" dirty="0" err="1" smtClean="0"/>
-              <a:t>Popis</a:t>
-            </a:r>
-            <a:r>
-              <a:rPr lang="en-US" dirty="0" smtClean="0"/>
+              <a:rPr lang="sk-SK" noProof="0" dirty="0" smtClean="0"/>
+              <a:t>Popis problému</a:t>
+            </a:r>
+            <a:endParaRPr lang="sk-SK" noProof="0" dirty="0"/>
+          </a:p>
+        </p:txBody>
+      </p:sp>
+      <p:sp>
+        <p:nvSpPr>
+          <p:cNvPr id="3" name="Content Placeholder 2"/>
+          <p:cNvSpPr>
+            <a:spLocks noGrp="1"/>
+          </p:cNvSpPr>
+          <p:nvPr>
+            <p:ph idx="1"/>
+          </p:nvPr>
+        </p:nvSpPr>
+        <p:spPr>
+          <a:xfrm>
+            <a:off x="1484310" y="1384299"/>
+            <a:ext cx="10018713" cy="5473701"/>
+          </a:xfrm>
+        </p:spPr>
+        <p:txBody>
+          <a:bodyPr>
+            <a:normAutofit/>
+          </a:bodyPr>
+          <a:lstStyle/>
+          <a:p>
+            <a:r>
+              <a:rPr lang="sk-SK" noProof="0" dirty="0" smtClean="0"/>
+              <a:t>dostať cieľový reťazec zo štartovnej populácie náhodných reťazcov</a:t>
+            </a:r>
+          </a:p>
+          <a:p>
+            <a:r>
+              <a:rPr lang="sk-SK" noProof="0" dirty="0" smtClean="0"/>
+              <a:t>Cieľový reťazec</a:t>
+            </a:r>
+            <a:r>
+              <a:rPr lang="sk-SK" noProof="0" dirty="0" smtClean="0"/>
+              <a:t>: „Ahoj, ako sa </a:t>
+            </a:r>
+            <a:r>
+              <a:rPr lang="sk-SK" noProof="0" dirty="0" err="1" smtClean="0"/>
+              <a:t>mas</a:t>
+            </a:r>
+            <a:r>
+              <a:rPr lang="sk-SK" noProof="0" dirty="0" smtClean="0"/>
+              <a:t>?“</a:t>
+            </a:r>
+            <a:endParaRPr lang="sk-SK" noProof="0" dirty="0" smtClean="0"/>
+          </a:p>
+          <a:p>
+            <a:r>
+              <a:rPr lang="sk-SK" noProof="0" dirty="0" smtClean="0"/>
+              <a:t>Príklad</a:t>
+            </a:r>
+            <a:r>
+              <a:rPr lang="sk-SK" noProof="0" dirty="0" smtClean="0"/>
+              <a:t> jedinca: „</a:t>
+            </a:r>
+            <a:r>
+              <a:rPr lang="sk-SK" noProof="0" dirty="0" err="1" smtClean="0"/>
+              <a:t>fjkghlk</a:t>
+            </a:r>
+            <a:r>
+              <a:rPr lang="sk-SK" noProof="0" dirty="0" smtClean="0"/>
               <a:t> </a:t>
             </a:r>
             <a:r>
-              <a:rPr lang="en-US" dirty="0" err="1" smtClean="0"/>
-              <a:t>problemu</a:t>
-            </a:r>
-            <a:endParaRPr lang="sk-SK" dirty="0"/>
-          </a:p>
-        </p:txBody>
-      </p:sp>
-      <p:sp>
-        <p:nvSpPr>
-          <p:cNvPr id="3" name="Content Placeholder 2"/>
-          <p:cNvSpPr>
-            <a:spLocks noGrp="1"/>
-          </p:cNvSpPr>
-          <p:nvPr>
-            <p:ph idx="1"/>
-          </p:nvPr>
-        </p:nvSpPr>
-        <p:spPr/>
-        <p:txBody>
-          <a:bodyPr/>
-          <a:lstStyle/>
-          <a:p>
-            <a:r>
-              <a:rPr lang="en-US" dirty="0" err="1" smtClean="0"/>
-              <a:t>Pohyb</a:t>
-            </a:r>
-            <a:r>
-              <a:rPr lang="en-US" dirty="0" smtClean="0"/>
+              <a:rPr lang="sk-SK" noProof="0" dirty="0" err="1" smtClean="0"/>
+              <a:t>ghig</a:t>
+            </a:r>
+            <a:r>
+              <a:rPr lang="sk-SK" noProof="0" dirty="0" smtClean="0"/>
               <a:t> </a:t>
             </a:r>
             <a:r>
-              <a:rPr lang="sk-SK" dirty="0"/>
-              <a:t>pohyb hore, dole, vľavo a </a:t>
-            </a:r>
+              <a:rPr lang="sk-SK" noProof="0" dirty="0" err="1" smtClean="0"/>
+              <a:t>gfy</a:t>
+            </a:r>
+            <a:r>
+              <a:rPr lang="sk-SK" noProof="0" dirty="0" smtClean="0"/>
+              <a:t> i“</a:t>
+            </a:r>
+          </a:p>
+          <a:p>
             <a:r>
               <a:rPr lang="sk-SK" dirty="0" smtClean="0"/>
-              <a:t>napravo</a:t>
-            </a:r>
-            <a:r>
-              <a:rPr lang="en-US" dirty="0" smtClean="0"/>
-              <a:t> ~ </a:t>
+              <a:t>Množina možných génov</a:t>
             </a:r>
             <a:r>
               <a:rPr lang="sk-SK" dirty="0" smtClean="0"/>
-              <a:t>H,D,L,P</a:t>
-            </a:r>
-            <a:endParaRPr lang="en-US" dirty="0" smtClean="0"/>
-          </a:p>
-          <a:p>
-            <a:r>
-              <a:rPr lang="sk-SK" dirty="0"/>
-              <a:t>20 znakový </a:t>
+              <a:t>: „</a:t>
+            </a:r>
+            <a:r>
+              <a:rPr lang="sk-SK" dirty="0" err="1" smtClean="0"/>
+              <a:t>abcdefghijklmnopqrstuvxyz</a:t>
             </a:r>
             <a:r>
               <a:rPr lang="sk-SK" dirty="0" smtClean="0"/>
-              <a:t>reťazec</a:t>
-            </a:r>
-            <a:r>
-              <a:rPr lang="en-US" dirty="0" smtClean="0"/>
-              <a:t> ~ </a:t>
-            </a:r>
-            <a:r>
-              <a:rPr lang="pl-PL" dirty="0"/>
-              <a:t>pohyb na políčkach mriežky </a:t>
-            </a:r>
-            <a:r>
-              <a:rPr lang="pl-PL" dirty="0" smtClean="0"/>
-              <a:t>4x5</a:t>
-            </a:r>
-            <a:endParaRPr lang="en-US" dirty="0" smtClean="0"/>
-          </a:p>
-          <a:p>
-            <a:r>
-              <a:rPr lang="pl-PL" dirty="0"/>
-              <a:t>začína na ľavom dolnom </a:t>
-            </a:r>
-            <a:r>
-              <a:rPr lang="pl-PL" dirty="0" smtClean="0"/>
-              <a:t>poli</a:t>
-            </a:r>
-            <a:endParaRPr lang="en-US" dirty="0" smtClean="0"/>
-          </a:p>
-          <a:p>
-            <a:r>
-              <a:rPr lang="sk-SK" dirty="0"/>
-              <a:t>pohyb </a:t>
-            </a:r>
+              <a:t> ,?“</a:t>
+            </a:r>
+          </a:p>
+          <a:p>
+            <a:pPr lvl="1"/>
             <a:r>
               <a:rPr lang="sk-SK" dirty="0" smtClean="0"/>
-              <a:t>mimo </a:t>
-            </a:r>
-            <a:r>
-              <a:rPr lang="sk-SK" dirty="0"/>
-              <a:t>mriežku, je </a:t>
-            </a:r>
-            <a:r>
-              <a:rPr lang="sk-SK" dirty="0" smtClean="0"/>
-              <a:t>ignorovaný</a:t>
-            </a:r>
-            <a:endParaRPr lang="en-US" dirty="0" smtClean="0"/>
-          </a:p>
-          <a:p>
-            <a:r>
-              <a:rPr lang="sk-SK" dirty="0"/>
-              <a:t>políčko mriežky bude pri návšteve reťazca označené ako </a:t>
-            </a:r>
-            <a:r>
-              <a:rPr lang="sk-SK" dirty="0" smtClean="0"/>
-              <a:t>navštívené</a:t>
-            </a:r>
-            <a:endParaRPr lang="en-US" dirty="0" smtClean="0"/>
-          </a:p>
-          <a:p>
-            <a:r>
-              <a:rPr lang="sk-SK" dirty="0"/>
-              <a:t>Fitnes reťazca bude úmerná počtu navštívených políčok</a:t>
-            </a:r>
+              <a:t>Stavový priestor sme si tak zmenšili</a:t>
+            </a:r>
+          </a:p>
+          <a:p>
+            <a:pPr lvl="1"/>
+            <a:endParaRPr lang="sk-SK" noProof="0" dirty="0" smtClean="0"/>
           </a:p>
         </p:txBody>
       </p:sp>
@@ -6460,140 +6440,183 @@
           <a:p>
             <a:pPr algn="l"/>
             <a:r>
-              <a:rPr lang="en-US" dirty="0" err="1" smtClean="0"/>
-              <a:t>Dalsie</a:t>
-            </a:r>
-            <a:r>
-              <a:rPr lang="en-US" dirty="0" smtClean="0"/>
-              <a:t> </a:t>
-            </a:r>
-            <a:r>
-              <a:rPr lang="en-US" dirty="0" err="1" smtClean="0"/>
-              <a:t>poziadavky</a:t>
-            </a:r>
+              <a:rPr lang="sk-SK" noProof="0" dirty="0" smtClean="0"/>
+              <a:t>Fitness funkcia</a:t>
+            </a:r>
+            <a:endParaRPr lang="sk-SK" noProof="0" dirty="0"/>
+          </a:p>
+        </p:txBody>
+      </p:sp>
+      <p:sp>
+        <p:nvSpPr>
+          <p:cNvPr id="3" name="Content Placeholder 2"/>
+          <p:cNvSpPr>
+            <a:spLocks noGrp="1"/>
+          </p:cNvSpPr>
+          <p:nvPr>
+            <p:ph idx="1"/>
+          </p:nvPr>
+        </p:nvSpPr>
+        <p:spPr>
+          <a:xfrm>
+            <a:off x="1484311" y="1460413"/>
+            <a:ext cx="10018713" cy="3162387"/>
+          </a:xfrm>
+        </p:spPr>
+        <p:txBody>
+          <a:bodyPr>
+            <a:normAutofit/>
+          </a:bodyPr>
+          <a:lstStyle/>
+          <a:p>
+            <a:r>
+              <a:rPr lang="sk-SK" noProof="0" dirty="0" smtClean="0"/>
+              <a:t>Fitnes je počet pozícií, v ktorých má rovnaké písmeno</a:t>
+            </a:r>
+          </a:p>
+          <a:p>
             <a:endParaRPr lang="sk-SK" dirty="0"/>
           </a:p>
-        </p:txBody>
-      </p:sp>
-      <p:sp>
-        <p:nvSpPr>
-          <p:cNvPr id="3" name="Content Placeholder 2"/>
-          <p:cNvSpPr>
-            <a:spLocks noGrp="1"/>
-          </p:cNvSpPr>
-          <p:nvPr>
-            <p:ph idx="1"/>
-          </p:nvPr>
-        </p:nvSpPr>
-        <p:spPr/>
-        <p:txBody>
-          <a:bodyPr/>
+          <a:p>
+            <a:endParaRPr lang="sk-SK" noProof="0" dirty="0" smtClean="0"/>
+          </a:p>
+        </p:txBody>
+      </p:sp>
+      <p:sp>
+        <p:nvSpPr>
+          <p:cNvPr id="4" name="TextBox 3"/>
+          <p:cNvSpPr txBox="1"/>
+          <p:nvPr/>
+        </p:nvSpPr>
+        <p:spPr>
+          <a:xfrm>
+            <a:off x="3050903" y="3213012"/>
+            <a:ext cx="7981406" cy="3046988"/>
+          </a:xfrm>
+          <a:prstGeom prst="rect">
+            <a:avLst/>
+          </a:prstGeom>
+        </p:spPr>
+        <p:style>
+          <a:lnRef idx="2">
+            <a:schemeClr val="accent1">
+              <a:shade val="50000"/>
+            </a:schemeClr>
+          </a:lnRef>
+          <a:fillRef idx="1">
+            <a:schemeClr val="accent1"/>
+          </a:fillRef>
+          <a:effectRef idx="0">
+            <a:schemeClr val="accent1"/>
+          </a:effectRef>
+          <a:fontRef idx="minor">
+            <a:schemeClr val="lt1"/>
+          </a:fontRef>
+        </p:style>
+        <p:txBody>
+          <a:bodyPr wrap="square" rtlCol="0">
+            <a:spAutoFit/>
+          </a:bodyPr>
           <a:lstStyle/>
           <a:p>
             <a:r>
-              <a:rPr lang="en-US" dirty="0" err="1" smtClean="0"/>
-              <a:t>Geneticky</a:t>
-            </a:r>
-            <a:r>
-              <a:rPr lang="en-US" dirty="0" smtClean="0"/>
-              <a:t> </a:t>
-            </a:r>
-            <a:r>
-              <a:rPr lang="en-US" dirty="0" err="1" smtClean="0"/>
-              <a:t>algoritmus</a:t>
-            </a:r>
-            <a:endParaRPr lang="en-US" dirty="0" smtClean="0"/>
-          </a:p>
-          <a:p>
-            <a:r>
-              <a:rPr lang="en-US" dirty="0" err="1" smtClean="0"/>
-              <a:t>Pouzit</a:t>
-            </a:r>
-            <a:r>
-              <a:rPr lang="en-US" dirty="0" smtClean="0"/>
-              <a:t> </a:t>
-            </a:r>
-            <a:r>
-              <a:rPr lang="en-US" dirty="0" err="1" smtClean="0"/>
-              <a:t>turnaj</a:t>
-            </a:r>
-            <a:endParaRPr lang="en-US" dirty="0" smtClean="0"/>
-          </a:p>
-          <a:p>
-            <a:r>
-              <a:rPr lang="sk-SK" dirty="0" err="1"/>
-              <a:t>Roulette</a:t>
-            </a:r>
-            <a:r>
-              <a:rPr lang="sk-SK" dirty="0"/>
-              <a:t> </a:t>
-            </a:r>
-            <a:r>
-              <a:rPr lang="sk-SK" dirty="0" smtClean="0"/>
-              <a:t>Wheel</a:t>
-            </a:r>
-            <a:endParaRPr lang="en-US" dirty="0" smtClean="0"/>
-          </a:p>
-          <a:p>
-            <a:r>
-              <a:rPr lang="en-US" dirty="0" err="1"/>
-              <a:t>Z</a:t>
-            </a:r>
-            <a:r>
-              <a:rPr lang="en-US" dirty="0" err="1" smtClean="0"/>
-              <a:t>mente</a:t>
-            </a:r>
-            <a:r>
-              <a:rPr lang="en-US" dirty="0" smtClean="0"/>
-              <a:t> </a:t>
-            </a:r>
-            <a:r>
-              <a:rPr lang="sk-SK" dirty="0" smtClean="0"/>
-              <a:t>fitness</a:t>
-            </a:r>
-            <a:endParaRPr lang="en-US" dirty="0" smtClean="0"/>
-          </a:p>
-          <a:p>
-            <a:r>
-              <a:rPr lang="en-US" dirty="0" smtClean="0"/>
-              <a:t>P</a:t>
-            </a:r>
-            <a:r>
-              <a:rPr lang="sk-SK" dirty="0" err="1" smtClean="0"/>
-              <a:t>oužit</a:t>
-            </a:r>
-            <a:r>
-              <a:rPr lang="en-US" dirty="0" smtClean="0"/>
-              <a:t>e</a:t>
-            </a:r>
-            <a:r>
-              <a:rPr lang="sk-SK" dirty="0" smtClean="0"/>
-              <a:t> </a:t>
-            </a:r>
-            <a:r>
-              <a:rPr lang="sk-SK" dirty="0" err="1" smtClean="0"/>
-              <a:t>elitizmu</a:t>
-            </a:r>
-            <a:r>
-              <a:rPr lang="en-US" dirty="0" smtClean="0"/>
-              <a:t>s</a:t>
-            </a:r>
-            <a:r>
-              <a:rPr lang="sk-SK" dirty="0" smtClean="0"/>
-              <a:t>, </a:t>
-            </a:r>
-            <a:r>
-              <a:rPr lang="sk-SK" dirty="0" err="1" smtClean="0"/>
-              <a:t>ranking</a:t>
-            </a:r>
-            <a:endParaRPr lang="sk-SK" dirty="0"/>
+              <a:rPr lang="en-US" sz="2400" dirty="0" smtClean="0"/>
+              <a:t>public </a:t>
+            </a:r>
+            <a:r>
+              <a:rPr lang="en-US" sz="2400" dirty="0"/>
+              <a:t>void </a:t>
+            </a:r>
+            <a:r>
+              <a:rPr lang="en-US" sz="2400" dirty="0" err="1"/>
+              <a:t>eval</a:t>
+            </a:r>
+            <a:r>
+              <a:rPr lang="en-US" sz="2400" dirty="0"/>
+              <a:t>() {</a:t>
+            </a:r>
+          </a:p>
+          <a:p>
+            <a:r>
+              <a:rPr lang="en-US" sz="2400" dirty="0"/>
+              <a:t>        fitness = 0;</a:t>
+            </a:r>
+          </a:p>
+          <a:p>
+            <a:r>
+              <a:rPr lang="en-US" sz="2400" dirty="0"/>
+              <a:t>        for (</a:t>
+            </a:r>
+            <a:r>
+              <a:rPr lang="en-US" sz="2400" dirty="0" err="1"/>
+              <a:t>int</a:t>
+            </a:r>
+            <a:r>
+              <a:rPr lang="en-US" sz="2400" dirty="0"/>
+              <a:t> a = 0; a &lt; </a:t>
+            </a:r>
+            <a:r>
+              <a:rPr lang="en-US" sz="2400" dirty="0" err="1"/>
+              <a:t>TARGET.length</a:t>
+            </a:r>
+            <a:r>
+              <a:rPr lang="en-US" sz="2400" dirty="0"/>
+              <a:t>(); a++) {</a:t>
+            </a:r>
+          </a:p>
+          <a:p>
+            <a:r>
+              <a:rPr lang="en-US" sz="2400" dirty="0"/>
+              <a:t>            if (</a:t>
+            </a:r>
+            <a:r>
+              <a:rPr lang="en-US" sz="2400" dirty="0" err="1"/>
+              <a:t>chromozon.charAt</a:t>
+            </a:r>
+            <a:r>
+              <a:rPr lang="en-US" sz="2400" dirty="0"/>
+              <a:t>(a) == </a:t>
+            </a:r>
+            <a:r>
+              <a:rPr lang="en-US" sz="2400" dirty="0" err="1"/>
+              <a:t>TARGET.charAt</a:t>
+            </a:r>
+            <a:r>
+              <a:rPr lang="en-US" sz="2400" dirty="0"/>
+              <a:t>(a)) {</a:t>
+            </a:r>
+          </a:p>
+          <a:p>
+            <a:r>
+              <a:rPr lang="en-US" sz="2400" dirty="0"/>
+              <a:t>                fitness++;</a:t>
+            </a:r>
+          </a:p>
+          <a:p>
+            <a:r>
+              <a:rPr lang="en-US" sz="2400" dirty="0"/>
+              <a:t>            }</a:t>
+            </a:r>
+          </a:p>
+          <a:p>
+            <a:r>
+              <a:rPr lang="en-US" sz="2400" dirty="0"/>
+              <a:t>        }</a:t>
+            </a:r>
+          </a:p>
+          <a:p>
+            <a:r>
+              <a:rPr lang="en-US" sz="2400" dirty="0" smtClean="0"/>
+              <a:t>}</a:t>
+            </a:r>
+            <a:endParaRPr lang="sk-SK" sz="2400" dirty="0"/>
           </a:p>
         </p:txBody>
       </p:sp>
     </p:spTree>
     <p:extLst>
       <p:ext uri="{BB962C8B-B14F-4D97-AF65-F5344CB8AC3E}">
-        <p14:creationId xmlns:p14="http://schemas.microsoft.com/office/powerpoint/2010/main" val="3260315458"/>
+        <p14:creationId xmlns:p14="http://schemas.microsoft.com/office/powerpoint/2010/main" val="3724557485"/>
       </p:ext>
     </p:extLst>
   </p:cSld>
@@ -6644,34 +6667,10 @@
           <a:p>
             <a:pPr algn="l"/>
             <a:r>
-              <a:rPr lang="en-US" dirty="0" err="1" smtClean="0"/>
-              <a:t>Kniznice</a:t>
-            </a:r>
-            <a:r>
-              <a:rPr lang="en-US" dirty="0" smtClean="0"/>
-              <a:t> </a:t>
-            </a:r>
-            <a:r>
-              <a:rPr lang="en-US" dirty="0" err="1" smtClean="0"/>
-              <a:t>na</a:t>
-            </a:r>
-            <a:r>
-              <a:rPr lang="en-US" dirty="0" smtClean="0"/>
-              <a:t> </a:t>
-            </a:r>
-            <a:r>
-              <a:rPr lang="en-US" dirty="0" err="1" smtClean="0"/>
-              <a:t>evolucny</a:t>
-            </a:r>
-            <a:r>
-              <a:rPr lang="en-US" dirty="0" smtClean="0"/>
-              <a:t> </a:t>
-            </a:r>
-            <a:r>
-              <a:rPr lang="en-US" dirty="0" err="1" smtClean="0"/>
-              <a:t>algoritmus</a:t>
-            </a:r>
-            <a:endParaRPr lang="sk-SK" dirty="0"/>
+              <a:rPr lang="sk-SK" noProof="0" dirty="0" smtClean="0"/>
+              <a:t>Ďalšie požiadavky</a:t>
+            </a:r>
+            <a:endParaRPr lang="sk-SK" noProof="0" dirty="0"/>
           </a:p>
         </p:txBody>
       </p:sp>
@@ -6684,274 +6683,132 @@
           <p:nvPr>
             <p:ph idx="1"/>
           </p:nvPr>
-        </p:nvSpPr>
-        <p:spPr/>
-        <p:txBody>
-          <a:bodyPr/>
-          <a:lstStyle/>
-          <a:p>
-            <a:r>
-              <a:rPr lang="en-US" dirty="0" err="1" smtClean="0"/>
-              <a:t>Jaga</a:t>
-            </a:r>
-            <a:r>
-              <a:rPr lang="en-US" dirty="0"/>
-              <a:t> - </a:t>
-            </a:r>
-            <a:r>
-              <a:rPr lang="en-US" dirty="0">
-                <a:hlinkClick r:id="rId2"/>
-              </a:rPr>
-              <a:t>http://jaga.sourceforge.net</a:t>
-            </a:r>
-            <a:r>
-              <a:rPr lang="en-US" dirty="0" smtClean="0">
-                <a:hlinkClick r:id="rId2"/>
-              </a:rPr>
-              <a:t>/</a:t>
-            </a:r>
-            <a:endParaRPr lang="en-US" dirty="0" smtClean="0"/>
-          </a:p>
-          <a:p>
-            <a:r>
-              <a:rPr lang="en-US" dirty="0" err="1" smtClean="0"/>
-              <a:t>Jenetics</a:t>
-            </a:r>
-            <a:r>
-              <a:rPr lang="en-US" dirty="0"/>
-              <a:t> - </a:t>
-            </a:r>
-            <a:r>
-              <a:rPr lang="en-US" dirty="0">
-                <a:hlinkClick r:id="rId3"/>
-              </a:rPr>
-              <a:t>http://jenetics.io</a:t>
-            </a:r>
-            <a:r>
-              <a:rPr lang="en-US" dirty="0" smtClean="0">
-                <a:hlinkClick r:id="rId3"/>
-              </a:rPr>
-              <a:t>/</a:t>
-            </a:r>
-            <a:endParaRPr lang="en-US" dirty="0" smtClean="0"/>
-          </a:p>
-          <a:p>
-            <a:r>
-              <a:rPr lang="en-US" dirty="0" err="1" smtClean="0"/>
-              <a:t>Jgap</a:t>
-            </a:r>
-            <a:r>
-              <a:rPr lang="en-US" dirty="0"/>
-              <a:t> - </a:t>
-            </a:r>
-            <a:r>
-              <a:rPr lang="en-US" dirty="0">
-                <a:hlinkClick r:id="rId4"/>
-              </a:rPr>
-              <a:t>http://jgap.sourceforge.net</a:t>
-            </a:r>
-            <a:r>
-              <a:rPr lang="en-US" dirty="0" smtClean="0">
-                <a:hlinkClick r:id="rId4"/>
-              </a:rPr>
-              <a:t>/</a:t>
-            </a:r>
-            <a:endParaRPr lang="en-US" dirty="0" smtClean="0"/>
-          </a:p>
-          <a:p>
-            <a:r>
-              <a:rPr lang="en-US" dirty="0" err="1" smtClean="0"/>
-              <a:t>Gajit</a:t>
-            </a:r>
-            <a:r>
-              <a:rPr lang="en-US" dirty="0"/>
-              <a:t> - </a:t>
-            </a:r>
-            <a:r>
-              <a:rPr lang="en-US" dirty="0">
-                <a:hlinkClick r:id="rId5"/>
-              </a:rPr>
-              <a:t>http://www.micropraxis.com/gajit</a:t>
-            </a:r>
-            <a:r>
-              <a:rPr lang="en-US" dirty="0" smtClean="0">
-                <a:hlinkClick r:id="rId5"/>
-              </a:rPr>
-              <a:t>/</a:t>
-            </a:r>
-            <a:endParaRPr lang="en-US" dirty="0" smtClean="0"/>
-          </a:p>
-          <a:p>
-            <a:r>
-              <a:rPr lang="en-US" dirty="0" err="1" smtClean="0"/>
-              <a:t>Moea</a:t>
-            </a:r>
-            <a:r>
-              <a:rPr lang="en-US" dirty="0"/>
-              <a:t> - </a:t>
-            </a:r>
-            <a:r>
-              <a:rPr lang="en-US" dirty="0">
-                <a:hlinkClick r:id="rId6"/>
-              </a:rPr>
-              <a:t>http://www.moeaframework.org</a:t>
-            </a:r>
-            <a:r>
-              <a:rPr lang="en-US" dirty="0" smtClean="0">
-                <a:hlinkClick r:id="rId6"/>
-              </a:rPr>
-              <a:t>/</a:t>
-            </a:r>
-            <a:endParaRPr lang="en-US" dirty="0"/>
-          </a:p>
-          <a:p>
-            <a:endParaRPr lang="en-US" dirty="0" smtClean="0"/>
-          </a:p>
-          <a:p>
-            <a:endParaRPr lang="sk-SK" dirty="0"/>
-          </a:p>
-        </p:txBody>
-      </p:sp>
-      <p:sp>
-        <p:nvSpPr>
-          <p:cNvPr id="4" name="TextBox 3"/>
-          <p:cNvSpPr txBox="1"/>
-          <p:nvPr/>
         </p:nvSpPr>
         <p:spPr>
           <a:xfrm>
-            <a:off x="6966066" y="5278582"/>
-            <a:ext cx="7298575" cy="1754326"/>
+            <a:off x="1484310" y="1917700"/>
+            <a:ext cx="10018713" cy="4940299"/>
           </a:xfrm>
-          <a:prstGeom prst="rect">
-            <a:avLst/>
-          </a:prstGeom>
-          <a:noFill/>
         </p:spPr>
         <p:txBody>
-          <a:bodyPr wrap="square" rtlCol="0">
-            <a:spAutoFit/>
+          <a:bodyPr>
+            <a:normAutofit/>
           </a:bodyPr>
           <a:lstStyle/>
           <a:p>
             <a:r>
+              <a:rPr lang="sk-SK" noProof="0" dirty="0" smtClean="0"/>
+              <a:t>Genetický algoritmus</a:t>
+            </a:r>
+          </a:p>
+          <a:p>
+            <a:r>
+              <a:rPr lang="sk-SK" dirty="0"/>
+              <a:t>V populácii 60 jedincov, ,max. počet generácii 1 </a:t>
+            </a:r>
+            <a:r>
               <a:rPr lang="sk-SK" dirty="0" smtClean="0"/>
-              <a:t>&lt;</a:t>
+              <a:t>000</a:t>
+            </a:r>
+            <a:endParaRPr lang="sk-SK" noProof="0" dirty="0" smtClean="0"/>
+          </a:p>
+          <a:p>
+            <a:r>
+              <a:rPr lang="sk-SK" noProof="0" dirty="0" smtClean="0"/>
+              <a:t>Použiť </a:t>
+            </a:r>
+            <a:r>
+              <a:rPr lang="pl-PL" noProof="0" dirty="0" smtClean="0"/>
+              <a:t>t</a:t>
+            </a:r>
+            <a:r>
+              <a:rPr lang="pl-PL" dirty="0" smtClean="0"/>
+              <a:t>urnaje</a:t>
+            </a:r>
+          </a:p>
+          <a:p>
+            <a:r>
+              <a:rPr lang="pl-PL" dirty="0"/>
+              <a:t>P</a:t>
             </a:r>
             <a:r>
               <a:rPr lang="sk-SK" dirty="0" err="1" smtClean="0"/>
-              <a:t>dependency</a:t>
+              <a:t>okus</a:t>
             </a:r>
             <a:r>
               <a:rPr lang="sk-SK" dirty="0" smtClean="0"/>
-              <a:t>&gt;</a:t>
-            </a:r>
-          </a:p>
-          <a:p>
+              <a:t> </a:t>
+            </a:r>
+            <a:r>
+              <a:rPr lang="sk-SK" dirty="0"/>
+              <a:t>opakovaný </a:t>
+            </a:r>
             <a:r>
               <a:rPr lang="sk-SK" dirty="0" smtClean="0"/>
-              <a:t>	&lt;</a:t>
-            </a:r>
-            <a:r>
-              <a:rPr lang="sk-SK" dirty="0" err="1" smtClean="0"/>
-              <a:t>groupId</a:t>
+              <a:t>100x</a:t>
+            </a:r>
+          </a:p>
+          <a:p>
+            <a:endParaRPr lang="sk-SK" dirty="0"/>
+          </a:p>
+          <a:p>
+            <a:r>
+              <a:rPr lang="sk-SK" dirty="0"/>
+              <a:t>Pre </a:t>
             </a:r>
             <a:r>
               <a:rPr lang="sk-SK" dirty="0" smtClean="0"/>
-              <a:t>&gt;</a:t>
-            </a:r>
-            <a:r>
-              <a:rPr lang="sk-SK" dirty="0" err="1" smtClean="0"/>
-              <a:t>org.bitbucket.fwilhelm</a:t>
+              <a:t>problém, </a:t>
+            </a:r>
+            <a:r>
+              <a:rPr lang="sk-SK" dirty="0"/>
+              <a:t>aký je najlepší počet jedincov v skupinke? </a:t>
+            </a:r>
+            <a:endParaRPr lang="sk-SK" dirty="0" smtClean="0"/>
+          </a:p>
+          <a:p>
+            <a:pPr lvl="1"/>
+            <a:r>
+              <a:rPr lang="sk-SK" dirty="0"/>
+              <a:t>vzhľadom na počet nahradení </a:t>
             </a:r>
             <a:r>
               <a:rPr lang="sk-SK" dirty="0" smtClean="0"/>
-              <a:t>&lt;/</a:t>
-            </a:r>
-            <a:r>
-              <a:rPr lang="sk-SK" dirty="0" err="1" smtClean="0"/>
-              <a:t>groupId</a:t>
+              <a:t>reťazcov</a:t>
+            </a:r>
+          </a:p>
+          <a:p>
+            <a:pPr lvl="1"/>
+            <a:r>
+              <a:rPr lang="sk-SK" dirty="0"/>
+              <a:t>vzhľadom na celkový počet ohodnotení </a:t>
             </a:r>
             <a:r>
               <a:rPr lang="sk-SK" dirty="0" smtClean="0"/>
-              <a:t>&gt;</a:t>
-            </a:r>
-          </a:p>
-          <a:p>
-            <a:r>
-              <a:rPr lang="sk-SK" dirty="0" smtClean="0"/>
-              <a:t>	&lt;</a:t>
-            </a:r>
-            <a:r>
-              <a:rPr lang="sk-SK" dirty="0" err="1" smtClean="0"/>
-              <a:t>artifactId</a:t>
-            </a:r>
-            <a:r>
-              <a:rPr lang="sk-SK" dirty="0" smtClean="0"/>
-              <a:t>&gt;</a:t>
-            </a:r>
-            <a:r>
-              <a:rPr lang="sk-SK" dirty="0" err="1" smtClean="0"/>
-              <a:t>org.jenetics</a:t>
-            </a:r>
-            <a:r>
-              <a:rPr lang="sk-SK" dirty="0" smtClean="0"/>
-              <a:t>&lt;/</a:t>
-            </a:r>
-            <a:r>
-              <a:rPr lang="sk-SK" dirty="0" err="1" smtClean="0"/>
-              <a:t>artifactId</a:t>
-            </a:r>
-            <a:r>
-              <a:rPr lang="sk-SK" dirty="0" smtClean="0"/>
-              <a:t>&gt;</a:t>
-            </a:r>
-          </a:p>
-          <a:p>
-            <a:r>
-              <a:rPr lang="sk-SK" dirty="0" smtClean="0"/>
-              <a:t>	&lt;</a:t>
-            </a:r>
-            <a:r>
-              <a:rPr lang="sk-SK" dirty="0" err="1" smtClean="0"/>
-              <a:t>version</a:t>
-            </a:r>
-            <a:r>
-              <a:rPr lang="sk-SK" dirty="0" smtClean="0"/>
-              <a:t>&gt;3.0.0&lt;/</a:t>
-            </a:r>
-            <a:r>
-              <a:rPr lang="sk-SK" dirty="0" err="1" smtClean="0"/>
-              <a:t>version</a:t>
-            </a:r>
-            <a:r>
-              <a:rPr lang="sk-SK" dirty="0" smtClean="0"/>
-              <a:t>&gt;</a:t>
-            </a:r>
-          </a:p>
-          <a:p>
-            <a:r>
-              <a:rPr lang="sk-SK" dirty="0" smtClean="0"/>
-              <a:t>&lt;/</a:t>
-            </a:r>
-            <a:r>
-              <a:rPr lang="sk-SK" dirty="0" err="1" smtClean="0"/>
-              <a:t>dependency</a:t>
-            </a:r>
-            <a:r>
-              <a:rPr lang="sk-SK" dirty="0" smtClean="0"/>
-              <a:t>&gt;</a:t>
-            </a:r>
-          </a:p>
-          <a:p>
+              <a:t>reťazcov</a:t>
+            </a:r>
+          </a:p>
+          <a:p>
+            <a:pPr lvl="1"/>
+            <a:r>
+              <a:rPr lang="fi-FI" dirty="0"/>
+              <a:t>veľkosti skupiny 2, 3, 5, </a:t>
+            </a:r>
+            <a:r>
+              <a:rPr lang="fi-FI" dirty="0" smtClean="0"/>
+              <a:t>10</a:t>
+            </a:r>
             <a:endParaRPr lang="sk-SK" dirty="0"/>
+          </a:p>
+          <a:p>
+            <a:endParaRPr lang="sk-SK" noProof="0" dirty="0" smtClean="0"/>
           </a:p>
         </p:txBody>
       </p:sp>
     </p:spTree>
     <p:extLst>
       <p:ext uri="{BB962C8B-B14F-4D97-AF65-F5344CB8AC3E}">
-        <p14:creationId xmlns:p14="http://schemas.microsoft.com/office/powerpoint/2010/main" val="54751052"/>
+        <p14:creationId xmlns:p14="http://schemas.microsoft.com/office/powerpoint/2010/main" val="3260315458"/>
       </p:ext>
     </p:extLst>
   </p:cSld>
@@ -7000,7 +6857,12 @@
           <a:bodyPr/>
           <a:lstStyle/>
           <a:p>
-            <a:endParaRPr lang="sk-SK"/>
+            <a:pPr algn="l"/>
+            <a:r>
+              <a:rPr lang="sk-SK" noProof="0" dirty="0" smtClean="0"/>
+              <a:t>Knižnice na evolučný algoritmus</a:t>
+            </a:r>
+            <a:endParaRPr lang="sk-SK" noProof="0" dirty="0"/>
           </a:p>
         </p:txBody>
       </p:sp>
@@ -7016,83 +6878,274 @@
         </p:nvSpPr>
         <p:spPr/>
         <p:txBody>
-          <a:bodyPr>
-            <a:normAutofit fontScale="62500" lnSpcReduction="20000"/>
+          <a:bodyPr/>
+          <a:lstStyle/>
+          <a:p>
+            <a:r>
+              <a:rPr lang="sk-SK" noProof="0" dirty="0" err="1" smtClean="0"/>
+              <a:t>Jaga</a:t>
+            </a:r>
+            <a:r>
+              <a:rPr lang="sk-SK" noProof="0" dirty="0" smtClean="0"/>
+              <a:t> - </a:t>
+            </a:r>
+            <a:r>
+              <a:rPr lang="sk-SK" noProof="0" dirty="0" smtClean="0">
+                <a:hlinkClick r:id="rId2"/>
+              </a:rPr>
+              <a:t>http://jaga.sourceforge.net/</a:t>
+            </a:r>
+            <a:endParaRPr lang="sk-SK" noProof="0" dirty="0" smtClean="0"/>
+          </a:p>
+          <a:p>
+            <a:r>
+              <a:rPr lang="sk-SK" noProof="0" dirty="0" err="1" smtClean="0"/>
+              <a:t>Jenetics</a:t>
+            </a:r>
+            <a:r>
+              <a:rPr lang="sk-SK" noProof="0" dirty="0" smtClean="0"/>
+              <a:t> - </a:t>
+            </a:r>
+            <a:r>
+              <a:rPr lang="sk-SK" noProof="0" dirty="0" smtClean="0">
+                <a:hlinkClick r:id="rId3"/>
+              </a:rPr>
+              <a:t>http://jenetics.io/</a:t>
+            </a:r>
+            <a:endParaRPr lang="sk-SK" noProof="0" dirty="0" smtClean="0"/>
+          </a:p>
+          <a:p>
+            <a:r>
+              <a:rPr lang="sk-SK" noProof="0" dirty="0" err="1" smtClean="0"/>
+              <a:t>Jgap</a:t>
+            </a:r>
+            <a:r>
+              <a:rPr lang="sk-SK" noProof="0" dirty="0" smtClean="0"/>
+              <a:t> - </a:t>
+            </a:r>
+            <a:r>
+              <a:rPr lang="sk-SK" noProof="0" dirty="0" smtClean="0">
+                <a:hlinkClick r:id="rId4"/>
+              </a:rPr>
+              <a:t>http://jgap.sourceforge.net/</a:t>
+            </a:r>
+            <a:endParaRPr lang="sk-SK" noProof="0" dirty="0" smtClean="0"/>
+          </a:p>
+          <a:p>
+            <a:r>
+              <a:rPr lang="sk-SK" noProof="0" dirty="0" err="1" smtClean="0"/>
+              <a:t>Gajit</a:t>
+            </a:r>
+            <a:r>
+              <a:rPr lang="sk-SK" noProof="0" dirty="0" smtClean="0"/>
+              <a:t> - </a:t>
+            </a:r>
+            <a:r>
+              <a:rPr lang="sk-SK" noProof="0" dirty="0" smtClean="0">
+                <a:hlinkClick r:id="rId5"/>
+              </a:rPr>
+              <a:t>http://www.micropraxis.com/gajit/</a:t>
+            </a:r>
+            <a:endParaRPr lang="sk-SK" noProof="0" dirty="0" smtClean="0"/>
+          </a:p>
+          <a:p>
+            <a:r>
+              <a:rPr lang="sk-SK" noProof="0" dirty="0" err="1" smtClean="0"/>
+              <a:t>Moea</a:t>
+            </a:r>
+            <a:r>
+              <a:rPr lang="sk-SK" noProof="0" dirty="0" smtClean="0"/>
+              <a:t> - </a:t>
+            </a:r>
+            <a:r>
+              <a:rPr lang="sk-SK" noProof="0" dirty="0" smtClean="0">
+                <a:hlinkClick r:id="rId6"/>
+              </a:rPr>
+              <a:t>http://www.moeaframework.org/</a:t>
+            </a:r>
+            <a:endParaRPr lang="sk-SK" noProof="0" dirty="0" smtClean="0"/>
+          </a:p>
+          <a:p>
+            <a:endParaRPr lang="sk-SK" noProof="0" dirty="0" smtClean="0"/>
+          </a:p>
+          <a:p>
+            <a:endParaRPr lang="sk-SK" noProof="0" dirty="0"/>
+          </a:p>
+        </p:txBody>
+      </p:sp>
+      <p:sp>
+        <p:nvSpPr>
+          <p:cNvPr id="4" name="TextBox 3"/>
+          <p:cNvSpPr txBox="1"/>
+          <p:nvPr/>
+        </p:nvSpPr>
+        <p:spPr>
+          <a:xfrm>
+            <a:off x="6966066" y="5278582"/>
+            <a:ext cx="7298575" cy="1754326"/>
+          </a:xfrm>
+          <a:prstGeom prst="rect">
+            <a:avLst/>
+          </a:prstGeom>
+          <a:noFill/>
+        </p:spPr>
+        <p:txBody>
+          <a:bodyPr wrap="square" rtlCol="0">
+            <a:spAutoFit/>
           </a:bodyPr>
           <a:lstStyle/>
           <a:p>
             <a:r>
-              <a:rPr lang="en-US" dirty="0"/>
-              <a:t>This class is for mutating a chromosomes of an given population. There are two distinct roles mutation </a:t>
-            </a:r>
-            <a:r>
-              <a:rPr lang="en-US" dirty="0" err="1"/>
-              <a:t>playsExploring</a:t>
-            </a:r>
-            <a:r>
-              <a:rPr lang="en-US" dirty="0"/>
-              <a:t> the search space. By making small moves mutation allows a population to explore the search space. This exploration is often slow compared to crossover, but in problems where crossover is disruptive this can be an important way to explore the landscape.</a:t>
-            </a:r>
-          </a:p>
-          <a:p>
-            <a:r>
-              <a:rPr lang="en-US" dirty="0"/>
-              <a:t>Maintaining diversity. Mutation prevents a population from correlating. Even if most of the search is being performed by crossover, mutation can be vital to provide the diversity which crossover needs.</a:t>
-            </a:r>
-          </a:p>
-          <a:p>
-            <a:r>
-              <a:rPr lang="en-US" dirty="0"/>
-              <a:t>The mutation probability is the parameter that must be optimized. The optimal value of the mutation rate depends on the role mutation plays. If mutation is the only source of exploration (if there is no crossover) then the mutation rate should be set so that a reasonable neighborhood of solutions is explored.</a:t>
-            </a:r>
-          </a:p>
-          <a:p>
-            <a:r>
-              <a:rPr lang="en-US" dirty="0"/>
-              <a:t>The mutation probability </a:t>
-            </a:r>
-            <a:r>
-              <a:rPr lang="en-US" i="1" dirty="0"/>
-              <a:t>P(m)</a:t>
-            </a:r>
-            <a:r>
-              <a:rPr lang="en-US" dirty="0"/>
-              <a:t> is the probability that a specific gene over the whole population is mutated. The number of available genes of an population is</a:t>
-            </a:r>
-          </a:p>
-          <a:p>
-            <a:r>
-              <a:rPr lang="en-US" dirty="0"/>
-              <a:t>where </a:t>
-            </a:r>
-            <a:r>
-              <a:rPr lang="en-US" i="1" dirty="0"/>
-              <a:t>N</a:t>
-            </a:r>
-            <a:r>
-              <a:rPr lang="en-US" i="1" baseline="-25000" dirty="0"/>
-              <a:t>P</a:t>
-            </a:r>
-            <a:r>
-              <a:rPr lang="en-US" dirty="0"/>
-              <a:t> is the population size, </a:t>
-            </a:r>
-            <a:r>
-              <a:rPr lang="en-US" i="1" dirty="0"/>
-              <a:t>N</a:t>
-            </a:r>
-            <a:r>
-              <a:rPr lang="en-US" i="1" baseline="-25000" dirty="0"/>
-              <a:t>g</a:t>
-            </a:r>
-            <a:r>
-              <a:rPr lang="en-US" dirty="0"/>
-              <a:t> the number of genes of a genotype. So the (average) number of genes mutated by the mutation is</a:t>
-            </a:r>
+              <a:rPr lang="sk-SK" dirty="0" smtClean="0"/>
+              <a:t>&lt;</a:t>
+            </a:r>
+            <a:r>
+              <a:rPr lang="sk-SK" dirty="0" err="1" smtClean="0"/>
+              <a:t>dependency</a:t>
+            </a:r>
+            <a:r>
+              <a:rPr lang="sk-SK" dirty="0" smtClean="0"/>
+              <a:t>&gt;</a:t>
+            </a:r>
+          </a:p>
+          <a:p>
+            <a:r>
+              <a:rPr lang="sk-SK" dirty="0" smtClean="0"/>
+              <a:t>	&lt;</a:t>
+            </a:r>
+            <a:r>
+              <a:rPr lang="sk-SK" dirty="0" err="1" smtClean="0"/>
+              <a:t>groupId</a:t>
+            </a:r>
+            <a:r>
+              <a:rPr lang="sk-SK" dirty="0" smtClean="0"/>
+              <a:t>&gt;</a:t>
+            </a:r>
+            <a:r>
+              <a:rPr lang="sk-SK" dirty="0" err="1" smtClean="0"/>
+              <a:t>org.bitbucket.fwilhelm</a:t>
+            </a:r>
+            <a:r>
+              <a:rPr lang="sk-SK" dirty="0" smtClean="0"/>
+              <a:t>&lt;/</a:t>
+            </a:r>
+            <a:r>
+              <a:rPr lang="sk-SK" dirty="0" err="1" smtClean="0"/>
+              <a:t>groupId</a:t>
+            </a:r>
+            <a:r>
+              <a:rPr lang="sk-SK" dirty="0" smtClean="0"/>
+              <a:t>&gt;</a:t>
+            </a:r>
+          </a:p>
+          <a:p>
+            <a:r>
+              <a:rPr lang="sk-SK" dirty="0" smtClean="0"/>
+              <a:t>	&lt;</a:t>
+            </a:r>
+            <a:r>
+              <a:rPr lang="sk-SK" dirty="0" err="1" smtClean="0"/>
+              <a:t>artifactId</a:t>
+            </a:r>
+            <a:r>
+              <a:rPr lang="sk-SK" dirty="0" smtClean="0"/>
+              <a:t>&gt;</a:t>
+            </a:r>
+            <a:r>
+              <a:rPr lang="sk-SK" dirty="0" err="1" smtClean="0"/>
+              <a:t>org.jenetics</a:t>
+            </a:r>
+            <a:r>
+              <a:rPr lang="sk-SK" dirty="0" smtClean="0"/>
+              <a:t>&lt;/</a:t>
+            </a:r>
+            <a:r>
+              <a:rPr lang="sk-SK" dirty="0" err="1" smtClean="0"/>
+              <a:t>artifactId</a:t>
+            </a:r>
+            <a:r>
+              <a:rPr lang="sk-SK" dirty="0" smtClean="0"/>
+              <a:t>&gt;</a:t>
+            </a:r>
+          </a:p>
+          <a:p>
+            <a:r>
+              <a:rPr lang="sk-SK" dirty="0" smtClean="0"/>
+              <a:t>	&lt;</a:t>
+            </a:r>
+            <a:r>
+              <a:rPr lang="sk-SK" dirty="0" err="1" smtClean="0"/>
+              <a:t>version</a:t>
+            </a:r>
+            <a:r>
+              <a:rPr lang="sk-SK" dirty="0" smtClean="0"/>
+              <a:t>&gt;3.0.0&lt;/</a:t>
+            </a:r>
+            <a:r>
+              <a:rPr lang="sk-SK" dirty="0" err="1" smtClean="0"/>
+              <a:t>version</a:t>
+            </a:r>
+            <a:r>
+              <a:rPr lang="sk-SK" dirty="0" smtClean="0"/>
+              <a:t>&gt;</a:t>
+            </a:r>
+          </a:p>
+          <a:p>
+            <a:r>
+              <a:rPr lang="sk-SK" dirty="0" smtClean="0"/>
+              <a:t>&lt;/</a:t>
+            </a:r>
+            <a:r>
+              <a:rPr lang="sk-SK" dirty="0" err="1" smtClean="0"/>
+              <a:t>dependency</a:t>
+            </a:r>
+            <a:r>
+              <a:rPr lang="sk-SK" dirty="0" smtClean="0"/>
+              <a:t>&gt;</a:t>
+            </a:r>
+          </a:p>
+          <a:p>
             <a:endParaRPr lang="sk-SK" dirty="0"/>
           </a:p>
         </p:txBody>
       </p:sp>
+    </p:spTree>
+    <p:extLst>
+      <p:ext uri="{BB962C8B-B14F-4D97-AF65-F5344CB8AC3E}">
+        <p14:creationId xmlns:p14="http://schemas.microsoft.com/office/powerpoint/2010/main" val="54751052"/>
+      </p:ext>
+    </p:extLst>
+  </p:cSld>
+  <p:clrMapOvr>
+    <a:masterClrMapping/>
+  </p:clrMapOvr>
+  <p:timing>
+    <p:tnLst>
+      <p:par>
+        <p:cTn id="1" dur="indefinite" restart="never" nodeType="tmRoot"/>
+      </p:par>
+    </p:tnLst>
+  </p:timing>
+</p:sld>
+</file>
+
+<file path=ppt/slides/slide6.xml><?xml version="1.0" encoding="utf-8"?>
+<p:sld xmlns:a="http://schemas.openxmlformats.org/drawingml/2006/main" xmlns:r="http://schemas.openxmlformats.org/officeDocument/2006/relationships" xmlns:p="http://schemas.openxmlformats.org/presentationml/2006/main">
+  <p:cSld>
+    <p:spTree>
+      <p:nvGrpSpPr>
+        <p:cNvPr id="1" name=""/>
+        <p:cNvGrpSpPr/>
+        <p:nvPr/>
+      </p:nvGrpSpPr>
+      <p:grpSpPr>
+        <a:xfrm>
+          <a:off x="0" y="0"/>
+          <a:ext cx="0" cy="0"/>
+          <a:chOff x="0" y="0"/>
+          <a:chExt cx="0" cy="0"/>
+        </a:xfrm>
+      </p:grpSpPr>
     </p:spTree>
     <p:extLst>
       <p:ext uri="{BB962C8B-B14F-4D97-AF65-F5344CB8AC3E}">

</xml_diff>